<commit_message>
Everything done except results
</commit_message>
<xml_diff>
--- a/poster.pptx
+++ b/poster.pptx
@@ -3853,6 +3853,102 @@
       </p:grpSpPr>
       <p:sp>
         <p:nvSpPr>
+          <p:cNvPr id="34" name="Rectangle 51">
+            <a:extLst>
+              <a:ext uri="{FF2B5EF4-FFF2-40B4-BE49-F238E27FC236}">
+                <a16:creationId xmlns:a16="http://schemas.microsoft.com/office/drawing/2014/main" id="{B6843990-5523-40C1-984D-DAE007982AC4}"/>
+              </a:ext>
+            </a:extLst>
+          </p:cNvPr>
+          <p:cNvSpPr>
+            <a:spLocks noChangeArrowheads="1"/>
+          </p:cNvSpPr>
+          <p:nvPr/>
+        </p:nvSpPr>
+        <p:spPr bwMode="auto">
+          <a:xfrm>
+            <a:off x="9982200" y="9829800"/>
+            <a:ext cx="9619712" cy="15392400"/>
+          </a:xfrm>
+          <a:prstGeom prst="rect">
+            <a:avLst/>
+          </a:prstGeom>
+          <a:solidFill>
+            <a:schemeClr val="bg1"/>
+          </a:solidFill>
+          <a:ln>
+            <a:noFill/>
+          </a:ln>
+          <a:extLst>
+            <a:ext uri="{91240B29-F687-4f45-9708-019B960494DF}">
+              <a14:hiddenLine xmlns="" xmlns:a14="http://schemas.microsoft.com/office/drawing/2010/main" w="9525">
+                <a:solidFill>
+                  <a:srgbClr val="000000"/>
+                </a:solidFill>
+                <a:miter lim="800000"/>
+                <a:headEnd/>
+                <a:tailEnd/>
+              </a14:hiddenLine>
+            </a:ext>
+          </a:extLst>
+        </p:spPr>
+        <p:txBody>
+          <a:bodyPr lIns="165000" tIns="165000" rIns="165000" bIns="165000"/>
+          <a:lstStyle/>
+          <a:p>
+            <a:pPr>
+              <a:spcBef>
+                <a:spcPct val="50000"/>
+              </a:spcBef>
+            </a:pPr>
+            <a:r>
+              <a:rPr lang="en-GB" sz="2400" b="1" u="sng" dirty="0">
+                <a:solidFill>
+                  <a:schemeClr val="tx2"/>
+                </a:solidFill>
+              </a:rPr>
+              <a:t>RESULTS</a:t>
+            </a:r>
+            <a:endParaRPr lang="en-GB" sz="2400" b="1" dirty="0">
+              <a:solidFill>
+                <a:srgbClr val="CC3300"/>
+              </a:solidFill>
+            </a:endParaRPr>
+          </a:p>
+          <a:p>
+            <a:endParaRPr lang="en-US" sz="1283" dirty="0">
+              <a:latin typeface="Georgia" charset="0"/>
+              <a:cs typeface="Georgia" charset="0"/>
+            </a:endParaRPr>
+          </a:p>
+          <a:p>
+            <a:pPr>
+              <a:spcBef>
+                <a:spcPct val="50000"/>
+              </a:spcBef>
+            </a:pPr>
+            <a:endParaRPr lang="en-US" sz="1833" b="1" dirty="0">
+              <a:solidFill>
+                <a:srgbClr val="CC3300"/>
+              </a:solidFill>
+            </a:endParaRPr>
+          </a:p>
+          <a:p>
+            <a:pPr>
+              <a:spcBef>
+                <a:spcPct val="50000"/>
+              </a:spcBef>
+            </a:pPr>
+            <a:endParaRPr lang="en-US" sz="1833" b="1" dirty="0">
+              <a:solidFill>
+                <a:srgbClr val="CC3300"/>
+              </a:solidFill>
+            </a:endParaRPr>
+          </a:p>
+        </p:txBody>
+      </p:sp>
+      <p:sp>
+        <p:nvSpPr>
           <p:cNvPr id="14337" name="Rectangle 5"/>
           <p:cNvSpPr>
             <a:spLocks noChangeArrowheads="1"/>
@@ -4438,6 +4534,48 @@
             </a:r>
           </a:p>
           <a:p>
+            <a:pPr marL="285750" indent="-285750">
+              <a:buFont typeface="Arial" panose="020B0604020202020204" pitchFamily="34" charset="0"/>
+              <a:buChar char="•"/>
+            </a:pPr>
+            <a:endParaRPr lang="en-US" sz="1800" dirty="0">
+              <a:latin typeface="Georgia" charset="0"/>
+            </a:endParaRPr>
+          </a:p>
+          <a:p>
+            <a:pPr marL="285750" indent="-285750">
+              <a:buFont typeface="Arial" panose="020B0604020202020204" pitchFamily="34" charset="0"/>
+              <a:buChar char="•"/>
+            </a:pPr>
+            <a:r>
+              <a:rPr lang="en-US" sz="1800" dirty="0">
+                <a:solidFill>
+                  <a:srgbClr val="FF0000"/>
+                </a:solidFill>
+                <a:latin typeface="Georgia" charset="0"/>
+              </a:rPr>
+              <a:t>TODO: Add equation</a:t>
+            </a:r>
+          </a:p>
+          <a:p>
+            <a:pPr marL="285750" indent="-285750">
+              <a:buFont typeface="Arial" panose="020B0604020202020204" pitchFamily="34" charset="0"/>
+              <a:buChar char="•"/>
+            </a:pPr>
+            <a:endParaRPr lang="en-US" sz="1800" dirty="0">
+              <a:latin typeface="Georgia" charset="0"/>
+            </a:endParaRPr>
+          </a:p>
+          <a:p>
+            <a:pPr marL="285750" indent="-285750">
+              <a:buFont typeface="Arial" panose="020B0604020202020204" pitchFamily="34" charset="0"/>
+              <a:buChar char="•"/>
+            </a:pPr>
+            <a:endParaRPr lang="en-US" sz="1800" dirty="0">
+              <a:latin typeface="Georgia" charset="0"/>
+            </a:endParaRPr>
+          </a:p>
+          <a:p>
             <a:endParaRPr lang="en-US" sz="1800" dirty="0">
               <a:latin typeface="Georgia" charset="0"/>
             </a:endParaRPr>
@@ -4531,39 +4669,148 @@
             </a:endParaRPr>
           </a:p>
           <a:p>
-            <a:r>
-              <a:rPr lang="en-US" sz="2000" u="sng" dirty="0">
-                <a:latin typeface="Georgia" charset="0"/>
-              </a:rPr>
-              <a:t>Kalman Filter</a:t>
-            </a:r>
-            <a:endParaRPr lang="en-US" sz="1800" dirty="0">
-              <a:latin typeface="Georgia" charset="0"/>
-            </a:endParaRPr>
-          </a:p>
-          <a:p>
             <a:pPr marL="285750" indent="-285750">
               <a:buFont typeface="Arial" panose="020B0604020202020204" pitchFamily="34" charset="0"/>
               <a:buChar char="•"/>
             </a:pPr>
-            <a:r>
-              <a:rPr lang="en-US" sz="1800" dirty="0">
-                <a:latin typeface="Georgia" charset="0"/>
-              </a:rPr>
-              <a:t>Two independent Kalman filters are used for the two agents.</a:t>
-            </a:r>
+            <a:endParaRPr lang="en-US" sz="1800" dirty="0">
+              <a:latin typeface="Georgia" charset="0"/>
+            </a:endParaRPr>
           </a:p>
           <a:p>
             <a:pPr marL="285750" indent="-285750">
               <a:buFont typeface="Arial" panose="020B0604020202020204" pitchFamily="34" charset="0"/>
               <a:buChar char="•"/>
             </a:pPr>
-            <a:r>
-              <a:rPr lang="en-US" sz="1800" dirty="0">
-                <a:latin typeface="Georgia" charset="0"/>
-              </a:rPr>
-              <a:t>The state includes the position and velocity of the agent.</a:t>
-            </a:r>
+            <a:endParaRPr lang="en-US" sz="1800" dirty="0">
+              <a:latin typeface="Georgia" charset="0"/>
+            </a:endParaRPr>
+          </a:p>
+          <a:p>
+            <a:pPr marL="285750" indent="-285750">
+              <a:buFont typeface="Arial" panose="020B0604020202020204" pitchFamily="34" charset="0"/>
+              <a:buChar char="•"/>
+            </a:pPr>
+            <a:endParaRPr lang="en-US" sz="1800" dirty="0">
+              <a:latin typeface="Georgia" charset="0"/>
+            </a:endParaRPr>
+          </a:p>
+          <a:p>
+            <a:pPr marL="285750" indent="-285750">
+              <a:buFont typeface="Arial" panose="020B0604020202020204" pitchFamily="34" charset="0"/>
+              <a:buChar char="•"/>
+            </a:pPr>
+            <a:endParaRPr lang="en-US" sz="1800" dirty="0">
+              <a:latin typeface="Georgia" charset="0"/>
+            </a:endParaRPr>
+          </a:p>
+          <a:p>
+            <a:pPr marL="285750" indent="-285750">
+              <a:buFont typeface="Arial" panose="020B0604020202020204" pitchFamily="34" charset="0"/>
+              <a:buChar char="•"/>
+            </a:pPr>
+            <a:endParaRPr lang="en-US" sz="1800" dirty="0">
+              <a:latin typeface="Georgia" charset="0"/>
+            </a:endParaRPr>
+          </a:p>
+          <a:p>
+            <a:pPr marL="285750" indent="-285750">
+              <a:buFont typeface="Arial" panose="020B0604020202020204" pitchFamily="34" charset="0"/>
+              <a:buChar char="•"/>
+            </a:pPr>
+            <a:endParaRPr lang="en-US" sz="1800" dirty="0">
+              <a:latin typeface="Georgia" charset="0"/>
+            </a:endParaRPr>
+          </a:p>
+          <a:p>
+            <a:pPr marL="285750" indent="-285750">
+              <a:buFont typeface="Arial" panose="020B0604020202020204" pitchFamily="34" charset="0"/>
+              <a:buChar char="•"/>
+            </a:pPr>
+            <a:endParaRPr lang="en-US" sz="1800" dirty="0">
+              <a:latin typeface="Georgia" charset="0"/>
+            </a:endParaRPr>
+          </a:p>
+          <a:p>
+            <a:pPr marL="285750" indent="-285750">
+              <a:buFont typeface="Arial" panose="020B0604020202020204" pitchFamily="34" charset="0"/>
+              <a:buChar char="•"/>
+            </a:pPr>
+            <a:endParaRPr lang="en-US" sz="1800" dirty="0">
+              <a:latin typeface="Georgia" charset="0"/>
+            </a:endParaRPr>
+          </a:p>
+          <a:p>
+            <a:pPr marL="285750" indent="-285750">
+              <a:buFont typeface="Arial" panose="020B0604020202020204" pitchFamily="34" charset="0"/>
+              <a:buChar char="•"/>
+            </a:pPr>
+            <a:endParaRPr lang="en-US" sz="1800" dirty="0">
+              <a:latin typeface="Georgia" charset="0"/>
+            </a:endParaRPr>
+          </a:p>
+          <a:p>
+            <a:pPr marL="285750" indent="-285750">
+              <a:buFont typeface="Arial" panose="020B0604020202020204" pitchFamily="34" charset="0"/>
+              <a:buChar char="•"/>
+            </a:pPr>
+            <a:endParaRPr lang="en-US" sz="1800" dirty="0">
+              <a:latin typeface="Georgia" charset="0"/>
+            </a:endParaRPr>
+          </a:p>
+          <a:p>
+            <a:pPr marL="285750" indent="-285750">
+              <a:buFont typeface="Arial" panose="020B0604020202020204" pitchFamily="34" charset="0"/>
+              <a:buChar char="•"/>
+            </a:pPr>
+            <a:endParaRPr lang="en-US" sz="1800" dirty="0">
+              <a:latin typeface="Georgia" charset="0"/>
+            </a:endParaRPr>
+          </a:p>
+          <a:p>
+            <a:pPr marL="285750" indent="-285750">
+              <a:buFont typeface="Arial" panose="020B0604020202020204" pitchFamily="34" charset="0"/>
+              <a:buChar char="•"/>
+            </a:pPr>
+            <a:endParaRPr lang="en-US" sz="1800" dirty="0">
+              <a:latin typeface="Georgia" charset="0"/>
+            </a:endParaRPr>
+          </a:p>
+          <a:p>
+            <a:pPr marL="285750" indent="-285750">
+              <a:buFont typeface="Arial" panose="020B0604020202020204" pitchFamily="34" charset="0"/>
+              <a:buChar char="•"/>
+            </a:pPr>
+            <a:endParaRPr lang="en-US" sz="1800" dirty="0">
+              <a:latin typeface="Georgia" charset="0"/>
+            </a:endParaRPr>
+          </a:p>
+          <a:p>
+            <a:pPr marL="285750" indent="-285750">
+              <a:buFont typeface="Arial" panose="020B0604020202020204" pitchFamily="34" charset="0"/>
+              <a:buChar char="•"/>
+            </a:pPr>
+            <a:endParaRPr lang="en-US" sz="1800" dirty="0">
+              <a:latin typeface="Georgia" charset="0"/>
+            </a:endParaRPr>
+          </a:p>
+          <a:p>
+            <a:pPr marL="285750" indent="-285750">
+              <a:buFont typeface="Arial" panose="020B0604020202020204" pitchFamily="34" charset="0"/>
+              <a:buChar char="•"/>
+            </a:pPr>
+            <a:endParaRPr lang="en-US" sz="1800" dirty="0">
+              <a:latin typeface="Georgia" charset="0"/>
+            </a:endParaRPr>
+          </a:p>
+          <a:p>
+            <a:pPr marL="285750" indent="-285750">
+              <a:buFont typeface="Arial" panose="020B0604020202020204" pitchFamily="34" charset="0"/>
+              <a:buChar char="•"/>
+            </a:pPr>
+            <a:endParaRPr lang="en-US" sz="1800" dirty="0">
+              <a:latin typeface="Georgia" charset="0"/>
+            </a:endParaRPr>
           </a:p>
           <a:p>
             <a:endParaRPr lang="en-US" sz="1800" dirty="0">
@@ -4615,8 +4862,8 @@
         </p:nvSpPr>
         <p:spPr bwMode="auto">
           <a:xfrm>
-            <a:off x="9982200" y="4343399"/>
-            <a:ext cx="9619712" cy="18755293"/>
+            <a:off x="9963688" y="4352566"/>
+            <a:ext cx="9619712" cy="5096234"/>
           </a:xfrm>
           <a:prstGeom prst="rect">
             <a:avLst/>
@@ -4644,22 +4891,102 @@
           <a:bodyPr lIns="165000" tIns="165000" rIns="165000" bIns="165000"/>
           <a:lstStyle/>
           <a:p>
+            <a:r>
+              <a:rPr lang="en-GB" sz="2800" b="1" u="sng" dirty="0">
+                <a:solidFill>
+                  <a:schemeClr val="tx2"/>
+                </a:solidFill>
+              </a:rPr>
+              <a:t>Methods – continued</a:t>
+            </a:r>
+          </a:p>
+          <a:p>
+            <a:endParaRPr lang="en-GB" sz="2400" b="1" dirty="0">
+              <a:solidFill>
+                <a:srgbClr val="CC3300"/>
+              </a:solidFill>
+            </a:endParaRPr>
+          </a:p>
+          <a:p>
+            <a:r>
+              <a:rPr lang="en-US" sz="2000" u="sng" dirty="0">
+                <a:latin typeface="Georgia" charset="0"/>
+              </a:rPr>
+              <a:t>Kalman Filter</a:t>
+            </a:r>
+            <a:endParaRPr lang="en-US" sz="2000" dirty="0">
+              <a:latin typeface="Georgia" charset="0"/>
+            </a:endParaRPr>
+          </a:p>
+          <a:p>
+            <a:pPr marL="285750" indent="-285750">
+              <a:buFont typeface="Arial" panose="020B0604020202020204" pitchFamily="34" charset="0"/>
+              <a:buChar char="•"/>
+            </a:pPr>
+            <a:r>
+              <a:rPr lang="en-US" sz="1800" dirty="0">
+                <a:latin typeface="Georgia" charset="0"/>
+              </a:rPr>
+              <a:t>Two independent Kalman filters are used for the two agents.</a:t>
+            </a:r>
+          </a:p>
+          <a:p>
+            <a:pPr marL="285750" indent="-285750">
+              <a:buFont typeface="Arial" panose="020B0604020202020204" pitchFamily="34" charset="0"/>
+              <a:buChar char="•"/>
+            </a:pPr>
+            <a:r>
+              <a:rPr lang="en-US" sz="1800" dirty="0">
+                <a:latin typeface="Georgia" charset="0"/>
+              </a:rPr>
+              <a:t>The state includes the position and velocity of the agent. The system dynamics matrix and observation matrix are listed  below, the measurement noise matrix is </a:t>
+            </a:r>
+            <a:r>
+              <a:rPr lang="en-US" sz="1800" dirty="0" err="1">
+                <a:latin typeface="Georgia" charset="0"/>
+              </a:rPr>
+              <a:t>diag</a:t>
+            </a:r>
+            <a:r>
+              <a:rPr lang="en-US" sz="1800" dirty="0">
+                <a:latin typeface="Georgia" charset="0"/>
+              </a:rPr>
+              <a:t>(0.1).</a:t>
+            </a:r>
+          </a:p>
+          <a:p>
             <a:pPr>
               <a:spcBef>
                 <a:spcPct val="50000"/>
               </a:spcBef>
             </a:pPr>
-            <a:r>
-              <a:rPr lang="en-GB" sz="2400" b="1" u="sng" dirty="0">
-                <a:solidFill>
-                  <a:schemeClr val="tx2"/>
-                </a:solidFill>
-              </a:rPr>
-              <a:t>RESULTS</a:t>
-            </a:r>
-            <a:endParaRPr lang="en-GB" sz="2400" b="1" dirty="0">
+            <a:endParaRPr lang="en-GB" sz="2400" b="1" u="sng" dirty="0">
               <a:solidFill>
-                <a:srgbClr val="CC3300"/>
+                <a:schemeClr val="tx2"/>
+              </a:solidFill>
+            </a:endParaRPr>
+          </a:p>
+          <a:p>
+            <a:pPr>
+              <a:spcBef>
+                <a:spcPct val="50000"/>
+              </a:spcBef>
+            </a:pPr>
+            <a:endParaRPr lang="en-GB" sz="2400" b="1" u="sng" dirty="0">
+              <a:solidFill>
+                <a:schemeClr val="tx2"/>
+              </a:solidFill>
+            </a:endParaRPr>
+          </a:p>
+          <a:p>
+            <a:pPr>
+              <a:spcBef>
+                <a:spcPct val="50000"/>
+              </a:spcBef>
+            </a:pPr>
+            <a:endParaRPr lang="en-GB" sz="2400" b="1" u="sng" dirty="0">
+              <a:solidFill>
+                <a:schemeClr val="tx2"/>
               </a:solidFill>
             </a:endParaRPr>
           </a:p>
@@ -4705,8 +5032,8 @@
         </p:nvSpPr>
         <p:spPr bwMode="auto">
           <a:xfrm>
-            <a:off x="9994702" y="23410417"/>
-            <a:ext cx="9619712" cy="6231383"/>
+            <a:off x="9994702" y="25679400"/>
+            <a:ext cx="9619712" cy="3962400"/>
           </a:xfrm>
           <a:prstGeom prst="rect">
             <a:avLst/>
@@ -4788,28 +5115,17 @@
             </a:r>
           </a:p>
           <a:p>
-            <a:pPr marL="285750" indent="-285750">
-              <a:buFont typeface="Arial" panose="020B0604020202020204" pitchFamily="34" charset="0"/>
-              <a:buChar char="•"/>
-            </a:pPr>
-            <a:endParaRPr lang="en-US" sz="2400" dirty="0">
-              <a:latin typeface="Georgia" charset="0"/>
-            </a:endParaRPr>
-          </a:p>
-          <a:p>
-            <a:pPr>
-              <a:spcBef>
-                <a:spcPct val="50000"/>
-              </a:spcBef>
-            </a:pPr>
-            <a:endParaRPr lang="en-GB" sz="2400" b="1" u="sng" dirty="0">
-              <a:solidFill>
-                <a:schemeClr val="tx2"/>
-              </a:solidFill>
-            </a:endParaRPr>
-          </a:p>
-          <a:p>
-            <a:endParaRPr lang="en-US" sz="1283" dirty="0"/>
+            <a:endParaRPr lang="en-US" sz="2400" dirty="0"/>
+          </a:p>
+          <a:p>
+            <a:r>
+              <a:rPr lang="en-GB" sz="2400" b="1" u="sng" dirty="0">
+                <a:solidFill>
+                  <a:schemeClr val="tx2"/>
+                </a:solidFill>
+              </a:rPr>
+              <a:t>Reference</a:t>
+            </a:r>
           </a:p>
           <a:p>
             <a:endParaRPr lang="en-US" sz="1283" dirty="0">
@@ -4937,8 +5253,8 @@
         </p:blipFill>
         <p:spPr>
           <a:xfrm>
-            <a:off x="1066800" y="13024188"/>
-            <a:ext cx="7608423" cy="4160497"/>
+            <a:off x="1159209" y="12992810"/>
+            <a:ext cx="7563740" cy="4136063"/>
           </a:xfrm>
           <a:prstGeom prst="rect">
             <a:avLst/>
@@ -5072,7 +5388,7 @@
         </p:nvSpPr>
         <p:spPr>
           <a:xfrm>
-            <a:off x="11811000" y="8469868"/>
+            <a:off x="11272568" y="14401800"/>
             <a:ext cx="6829963" cy="369332"/>
           </a:xfrm>
           <a:prstGeom prst="rect">
@@ -5090,11 +5406,41 @@
               <a:rPr lang="en-US" sz="1800" i="1" dirty="0">
                 <a:latin typeface="Georgia" charset="0"/>
               </a:rPr>
-              <a:t>Figure 3. Ground truth, mixed and separated signals.</a:t>
-            </a:r>
-          </a:p>
-        </p:txBody>
-      </p:sp>
+              <a:t>Figure 4. Ground truth, mixed and separated signals.</a:t>
+            </a:r>
+          </a:p>
+        </p:txBody>
+      </p:sp>
+      <p:pic>
+        <p:nvPicPr>
+          <p:cNvPr id="9" name="Picture 8">
+            <a:extLst>
+              <a:ext uri="{FF2B5EF4-FFF2-40B4-BE49-F238E27FC236}">
+                <a16:creationId xmlns:a16="http://schemas.microsoft.com/office/drawing/2014/main" id="{D03386B6-9FF2-416F-81A0-62EA1114CC75}"/>
+              </a:ext>
+            </a:extLst>
+          </p:cNvPr>
+          <p:cNvPicPr>
+            <a:picLocks noChangeAspect="1"/>
+          </p:cNvPicPr>
+          <p:nvPr/>
+        </p:nvPicPr>
+        <p:blipFill>
+          <a:blip r:embed="rId5"/>
+          <a:stretch>
+            <a:fillRect/>
+          </a:stretch>
+        </p:blipFill>
+        <p:spPr>
+          <a:xfrm>
+            <a:off x="1495425" y="24252572"/>
+            <a:ext cx="5369640" cy="3607357"/>
+          </a:xfrm>
+          <a:prstGeom prst="rect">
+            <a:avLst/>
+          </a:prstGeom>
+        </p:spPr>
+      </p:pic>
       <p:sp>
         <p:nvSpPr>
           <p:cNvPr id="29" name="TextBox 28">
@@ -5109,7 +5455,7 @@
         </p:nvSpPr>
         <p:spPr>
           <a:xfrm>
-            <a:off x="11810999" y="12781003"/>
+            <a:off x="11506200" y="18364200"/>
             <a:ext cx="6829963" cy="369332"/>
           </a:xfrm>
           <a:prstGeom prst="rect">
@@ -5127,11 +5473,90 @@
               <a:rPr lang="en-US" sz="1800" i="1" dirty="0">
                 <a:latin typeface="Georgia" charset="0"/>
               </a:rPr>
-              <a:t>Figure 4. The tracking error overtime.</a:t>
-            </a:r>
-          </a:p>
-        </p:txBody>
-      </p:sp>
+              <a:t>Figure 5. The tracking error overtime.</a:t>
+            </a:r>
+          </a:p>
+        </p:txBody>
+      </p:sp>
+      <p:sp>
+        <p:nvSpPr>
+          <p:cNvPr id="31" name="TextBox 30">
+            <a:extLst>
+              <a:ext uri="{FF2B5EF4-FFF2-40B4-BE49-F238E27FC236}">
+                <a16:creationId xmlns:a16="http://schemas.microsoft.com/office/drawing/2014/main" id="{22D81E2B-36BC-4945-993D-261B181D0F22}"/>
+              </a:ext>
+            </a:extLst>
+          </p:cNvPr>
+          <p:cNvSpPr txBox="1"/>
+          <p:nvPr/>
+        </p:nvSpPr>
+        <p:spPr>
+          <a:xfrm>
+            <a:off x="1070000" y="27761362"/>
+            <a:ext cx="7997800" cy="1200329"/>
+          </a:xfrm>
+          <a:prstGeom prst="rect">
+            <a:avLst/>
+          </a:prstGeom>
+          <a:noFill/>
+        </p:spPr>
+        <p:txBody>
+          <a:bodyPr wrap="square" rtlCol="0">
+            <a:spAutoFit/>
+          </a:bodyPr>
+          <a:lstStyle/>
+          <a:p>
+            <a:r>
+              <a:rPr lang="en-US" sz="1800" i="1" dirty="0">
+                <a:latin typeface="Georgia" charset="0"/>
+              </a:rPr>
+              <a:t>Figure 3. Localization of an agent. The difference in time-of-arrival is r1-r2, while the magnitude ratio is r1/r2, which together gives the value of r1 and r2. With the locations of the mics known, the </a:t>
+            </a:r>
+            <a:r>
+              <a:rPr lang="en-US" sz="1800" i="1" dirty="0" err="1">
+                <a:latin typeface="Georgia" charset="0"/>
+              </a:rPr>
+              <a:t>x,y</a:t>
+            </a:r>
+            <a:r>
+              <a:rPr lang="en-US" sz="1800" i="1" dirty="0">
+                <a:latin typeface="Georgia" charset="0"/>
+              </a:rPr>
+              <a:t> positions can be triangulated. </a:t>
+            </a:r>
+          </a:p>
+        </p:txBody>
+      </p:sp>
+      <p:pic>
+        <p:nvPicPr>
+          <p:cNvPr id="10" name="Picture 9">
+            <a:extLst>
+              <a:ext uri="{FF2B5EF4-FFF2-40B4-BE49-F238E27FC236}">
+                <a16:creationId xmlns:a16="http://schemas.microsoft.com/office/drawing/2014/main" id="{719C9E7F-312F-4A44-8A08-FC555C6726CB}"/>
+              </a:ext>
+            </a:extLst>
+          </p:cNvPr>
+          <p:cNvPicPr>
+            <a:picLocks noChangeAspect="1"/>
+          </p:cNvPicPr>
+          <p:nvPr/>
+        </p:nvPicPr>
+        <p:blipFill>
+          <a:blip r:embed="rId6"/>
+          <a:stretch>
+            <a:fillRect/>
+          </a:stretch>
+        </p:blipFill>
+        <p:spPr>
+          <a:xfrm>
+            <a:off x="10580862" y="6579109"/>
+            <a:ext cx="7343775" cy="1762125"/>
+          </a:xfrm>
+          <a:prstGeom prst="rect">
+            <a:avLst/>
+          </a:prstGeom>
+        </p:spPr>
+      </p:pic>
     </p:spTree>
   </p:cSld>
   <p:clrMapOvr>

</xml_diff>